<commit_message>
PPT - added a note about the range/rows to the framing slide. Code - Removed the first_value/last_value from the demo. Moved to new file.
</commit_message>
<xml_diff>
--- a/Presentation/TSQL_Windowing.pptx
+++ b/Presentation/TSQL_Windowing.pptx
@@ -5814,11 +5814,7 @@
           <a:p>
             <a:r>
               <a:rPr lang="en-US" dirty="0" smtClean="0"/>
-              <a:t>Window </a:t>
-            </a:r>
-            <a:r>
-              <a:rPr lang="en-US" dirty="0" smtClean="0"/>
-              <a:t>Functions</a:t>
+              <a:t>Window Functions</a:t>
             </a:r>
             <a:endParaRPr lang="en-US" dirty="0"/>
           </a:p>
@@ -5850,19 +5846,13 @@
               <a:rPr lang="en-US" dirty="0" smtClean="0"/>
               <a:t>ROW_NUMBER – Sequencing</a:t>
             </a:r>
-            <a:endParaRPr lang="en-US" dirty="0" smtClean="0"/>
           </a:p>
           <a:p>
             <a:pPr lvl="1"/>
             <a:r>
               <a:rPr lang="en-US" dirty="0" smtClean="0"/>
-              <a:t>RANK/DENSE_RANK/NTILE – Ordering fo</a:t>
-            </a:r>
-            <a:r>
-              <a:rPr lang="en-US" dirty="0" smtClean="0"/>
-              <a:t>r ranks</a:t>
-            </a:r>
-            <a:endParaRPr lang="en-US" dirty="0" smtClean="0"/>
+              <a:t>RANK/DENSE_RANK/NTILE – Ordering for ranks</a:t>
+            </a:r>
           </a:p>
           <a:p>
             <a:r>
@@ -5956,11 +5946,7 @@
           <a:p>
             <a:r>
               <a:rPr lang="en-US" dirty="0" smtClean="0"/>
-              <a:t>What </a:t>
-            </a:r>
-            <a:r>
-              <a:rPr lang="en-US" dirty="0" smtClean="0"/>
-              <a:t>are Window functions?</a:t>
+              <a:t>What are Window functions?</a:t>
             </a:r>
           </a:p>
           <a:p>
@@ -6285,7 +6271,6 @@
               <a:rPr lang="en-US" dirty="0" smtClean="0"/>
               <a:t>The PARTITION BY defines the window</a:t>
             </a:r>
-            <a:endParaRPr lang="en-US" dirty="0" smtClean="0"/>
           </a:p>
           <a:p>
             <a:r>
@@ -6573,8 +6558,18 @@
           <a:lstStyle/>
           <a:p>
             <a:r>
+              <a:rPr lang="en-US" dirty="0" smtClean="0"/>
+              <a:t>RANGE and ROWS for specifying the window</a:t>
+            </a:r>
+          </a:p>
+          <a:p>
+            <a:r>
+              <a:rPr lang="en-US" dirty="0" smtClean="0"/>
+              <a:t>First </a:t>
+            </a:r>
+            <a:r>
               <a:rPr lang="en-US" dirty="0"/>
-              <a:t>First Value/Last </a:t>
+              <a:t>Value/Last </a:t>
             </a:r>
             <a:r>
               <a:rPr lang="en-US" dirty="0" smtClean="0"/>
@@ -6584,15 +6579,7 @@
           <a:p>
             <a:r>
               <a:rPr lang="en-US" dirty="0" smtClean="0"/>
-              <a:t>Find </a:t>
-            </a:r>
-            <a:r>
-              <a:rPr lang="en-US" dirty="0" smtClean="0"/>
-              <a:t>the beginning or end of a </a:t>
-            </a:r>
-            <a:r>
-              <a:rPr lang="en-US" dirty="0" smtClean="0"/>
-              <a:t>frame</a:t>
+              <a:t>Find the beginning or end of a frame</a:t>
             </a:r>
           </a:p>
           <a:p>
@@ -7548,11 +7535,7 @@
           <a:p>
             <a:r>
               <a:rPr lang="en-US" dirty="0" smtClean="0"/>
-              <a:t>Thanks for </a:t>
-            </a:r>
-            <a:r>
-              <a:rPr lang="en-US" dirty="0" smtClean="0"/>
-              <a:t>coming</a:t>
+              <a:t>Thanks for coming</a:t>
             </a:r>
           </a:p>
           <a:p>
@@ -7560,7 +7543,6 @@
               <a:rPr lang="en-US" dirty="0" smtClean="0"/>
               <a:t>Please fill out evaluations</a:t>
             </a:r>
-            <a:endParaRPr lang="en-US" dirty="0" smtClean="0"/>
           </a:p>
           <a:p>
             <a:r>
@@ -7571,11 +7553,7 @@
           <a:p>
             <a:r>
               <a:rPr lang="en-US" dirty="0" smtClean="0"/>
-              <a:t>More </a:t>
-            </a:r>
-            <a:r>
-              <a:rPr lang="en-US" dirty="0" smtClean="0"/>
-              <a:t>information</a:t>
+              <a:t>More information</a:t>
             </a:r>
             <a:endParaRPr lang="en-US" sz="3200" dirty="0" smtClean="0">
               <a:hlinkClick r:id="rId2"/>
@@ -7641,15 +7619,6 @@
               </a:rPr>
               <a:t>www.voiceofthedba.com</a:t>
             </a:r>
-            <a:endParaRPr lang="en-US" sz="2700" dirty="0">
-              <a:solidFill>
-                <a:schemeClr val="tx1">
-                  <a:lumMod val="50000"/>
-                  <a:lumOff val="50000"/>
-                </a:schemeClr>
-              </a:solidFill>
-              <a:latin typeface="Microsoft Sans Serif" panose="020B0604020202020204" pitchFamily="34" charset="0"/>
-            </a:endParaRPr>
           </a:p>
         </p:txBody>
       </p:sp>
@@ -7885,15 +7854,6 @@
               </a:rPr>
               <a:t>/in/way0utwest</a:t>
             </a:r>
-            <a:endParaRPr lang="en-US" sz="2700" dirty="0">
-              <a:solidFill>
-                <a:schemeClr val="tx1">
-                  <a:lumMod val="50000"/>
-                  <a:lumOff val="50000"/>
-                </a:schemeClr>
-              </a:solidFill>
-              <a:latin typeface="Microsoft Sans Serif" panose="020B0604020202020204" pitchFamily="34" charset="0"/>
-            </a:endParaRPr>
           </a:p>
         </p:txBody>
       </p:sp>
@@ -8526,15 +8486,6 @@
               </a:rPr>
               <a:t>www.voiceofthedba.com</a:t>
             </a:r>
-            <a:endParaRPr lang="en-US" sz="2700" dirty="0">
-              <a:solidFill>
-                <a:schemeClr val="tx1">
-                  <a:lumMod val="50000"/>
-                  <a:lumOff val="50000"/>
-                </a:schemeClr>
-              </a:solidFill>
-              <a:latin typeface="Microsoft Sans Serif" panose="020B0604020202020204" pitchFamily="34" charset="0"/>
-            </a:endParaRPr>
           </a:p>
         </p:txBody>
       </p:sp>
@@ -8661,13 +8612,6 @@
               </a:rPr>
               <a:t>Steve Jones</a:t>
             </a:r>
-            <a:endParaRPr lang="en-US" sz="2800" b="1" dirty="0">
-              <a:solidFill>
-                <a:srgbClr val="CC0000"/>
-              </a:solidFill>
-              <a:latin typeface="Arial"/>
-              <a:cs typeface="Arial"/>
-            </a:endParaRPr>
           </a:p>
         </p:txBody>
       </p:sp>
@@ -8812,15 +8756,6 @@
               </a:rPr>
               <a:t>/in/way0utwest</a:t>
             </a:r>
-            <a:endParaRPr lang="en-US" sz="2700" dirty="0">
-              <a:solidFill>
-                <a:schemeClr val="tx1">
-                  <a:lumMod val="50000"/>
-                  <a:lumOff val="50000"/>
-                </a:schemeClr>
-              </a:solidFill>
-              <a:latin typeface="Microsoft Sans Serif" panose="020B0604020202020204" pitchFamily="34" charset="0"/>
-            </a:endParaRPr>
           </a:p>
         </p:txBody>
       </p:sp>

</xml_diff>

<commit_message>
reformatted main slides with lighter background. Final for Submission
</commit_message>
<xml_diff>
--- a/Presentation/TSQL_Windowing.pptx
+++ b/Presentation/TSQL_Windowing.pptx
@@ -244,7 +244,7 @@
           <a:p>
             <a:fld id="{F2F907C9-8666-45EC-BDB3-62480554DCC1}" type="datetimeFigureOut">
               <a:rPr lang="en-US" smtClean="0"/>
-              <a:t>8/12/2015</a:t>
+              <a:t>8/13/2015</a:t>
             </a:fld>
             <a:endParaRPr lang="en-US"/>
           </a:p>
@@ -1941,7 +1941,6 @@
               <a:rPr lang="en-US" noProof="0" smtClean="0"/>
               <a:t>Click icon to add picture</a:t>
             </a:r>
-            <a:endParaRPr lang="en-US" noProof="0" smtClean="0"/>
           </a:p>
         </p:txBody>
       </p:sp>
@@ -2567,7 +2566,7 @@
             <a:fld id="{1D8BD707-D9CF-40AE-B4C6-C98DA3205C09}" type="datetimeFigureOut">
               <a:rPr lang="en-US" smtClean="0"/>
               <a:pPr/>
-              <a:t>8/12/2015</a:t>
+              <a:t>8/13/2015</a:t>
             </a:fld>
             <a:endParaRPr lang="en-US"/>
           </a:p>
@@ -2771,7 +2770,7 @@
             <a:fld id="{1D8BD707-D9CF-40AE-B4C6-C98DA3205C09}" type="datetimeFigureOut">
               <a:rPr lang="en-US" smtClean="0"/>
               <a:pPr/>
-              <a:t>8/12/2015</a:t>
+              <a:t>8/13/2015</a:t>
             </a:fld>
             <a:endParaRPr lang="en-US"/>
           </a:p>
@@ -3231,7 +3230,7 @@
             <a:fld id="{1D8BD707-D9CF-40AE-B4C6-C98DA3205C09}" type="datetimeFigureOut">
               <a:rPr lang="en-US" smtClean="0"/>
               <a:pPr/>
-              <a:t>8/12/2015</a:t>
+              <a:t>8/13/2015</a:t>
             </a:fld>
             <a:endParaRPr lang="en-US"/>
           </a:p>
@@ -5670,7 +5669,6 @@
               <a:rPr lang="en-US" altLang="en-US" smtClean="0"/>
               <a:t>Fifth level</a:t>
             </a:r>
-            <a:endParaRPr lang="en-US" altLang="en-US" smtClean="0"/>
           </a:p>
         </p:txBody>
       </p:sp>
@@ -8598,7 +8596,7 @@
         </p:blipFill>
         <p:spPr>
           <a:xfrm>
-            <a:off x="2850359" y="1570037"/>
+            <a:off x="2850359" y="1600200"/>
             <a:ext cx="3443281" cy="4525963"/>
           </a:xfrm>
         </p:spPr>
@@ -9497,7 +9495,7 @@
         </p:nvSpPr>
         <p:spPr/>
         <p:txBody>
-          <a:bodyPr/>
+          <a:bodyPr anchor="t"/>
           <a:lstStyle/>
           <a:p>
             <a:r>
@@ -9691,11 +9689,17 @@
             <p:ph type="title"/>
           </p:nvPr>
         </p:nvSpPr>
-        <p:spPr/>
+        <p:spPr>
+          <a:xfrm>
+            <a:off x="457200" y="533400"/>
+            <a:ext cx="8229600" cy="1143000"/>
+          </a:xfrm>
+        </p:spPr>
         <p:txBody>
           <a:bodyPr/>
           <a:lstStyle/>
           <a:p>
+            <a:pPr algn="l"/>
             <a:r>
               <a:rPr lang="en-US" dirty="0" smtClean="0"/>
               <a:t>Demo</a:t>
@@ -9711,12 +9715,12 @@
             <a:spLocks noGrp="1"/>
           </p:cNvSpPr>
           <p:nvPr>
-            <p:ph type="body" idx="1"/>
+            <p:ph idx="1"/>
           </p:nvPr>
         </p:nvSpPr>
         <p:spPr/>
         <p:txBody>
-          <a:bodyPr/>
+          <a:bodyPr anchor="t"/>
           <a:lstStyle/>
           <a:p>
             <a:r>
@@ -9917,7 +9921,7 @@
         </p:nvSpPr>
         <p:spPr/>
         <p:txBody>
-          <a:bodyPr/>
+          <a:bodyPr anchor="t"/>
           <a:lstStyle/>
           <a:p>
             <a:r>
@@ -9998,6 +10002,7 @@
           <a:bodyPr/>
           <a:lstStyle/>
           <a:p>
+            <a:pPr algn="l"/>
             <a:r>
               <a:rPr lang="en-US" dirty="0" smtClean="0"/>
               <a:t>Demo</a:t>
@@ -10013,12 +10018,12 @@
             <a:spLocks noGrp="1"/>
           </p:cNvSpPr>
           <p:nvPr>
-            <p:ph type="body" idx="1"/>
+            <p:ph idx="1"/>
           </p:nvPr>
         </p:nvSpPr>
         <p:spPr/>
         <p:txBody>
-          <a:bodyPr/>
+          <a:bodyPr anchor="t"/>
           <a:lstStyle/>
           <a:p>
             <a:r>
@@ -10219,7 +10224,7 @@
         </p:nvSpPr>
         <p:spPr/>
         <p:txBody>
-          <a:bodyPr/>
+          <a:bodyPr anchor="t"/>
           <a:lstStyle/>
           <a:p>
             <a:r>
@@ -10308,6 +10313,7 @@
           <a:bodyPr/>
           <a:lstStyle/>
           <a:p>
+            <a:pPr algn="l"/>
             <a:r>
               <a:rPr lang="en-US" dirty="0" smtClean="0"/>
               <a:t>Demo</a:t>
@@ -10323,12 +10329,12 @@
             <a:spLocks noGrp="1"/>
           </p:cNvSpPr>
           <p:nvPr>
-            <p:ph type="body" idx="1"/>
+            <p:ph idx="1"/>
           </p:nvPr>
         </p:nvSpPr>
         <p:spPr/>
         <p:txBody>
-          <a:bodyPr/>
+          <a:bodyPr anchor="t"/>
           <a:lstStyle/>
           <a:p>
             <a:r>
@@ -10558,20 +10564,20 @@
         </p:nvSpPr>
         <p:spPr/>
         <p:txBody>
-          <a:bodyPr/>
+          <a:bodyPr anchor="t"/>
           <a:lstStyle/>
           <a:p>
             <a:r>
-              <a:rPr lang="en-US" dirty="0" smtClean="0"/>
+              <a:rPr lang="en-US" sz="2800" dirty="0" smtClean="0"/>
               <a:t>Look back (LAG) or peek forward (LEAD)</a:t>
             </a:r>
           </a:p>
           <a:p>
             <a:r>
-              <a:rPr lang="en-US" dirty="0" smtClean="0"/>
+              <a:rPr lang="en-US" sz="2800" dirty="0" smtClean="0"/>
               <a:t>Parameters for offset and default</a:t>
             </a:r>
-            <a:endParaRPr lang="en-US" dirty="0"/>
+            <a:endParaRPr lang="en-US" sz="2800" dirty="0"/>
           </a:p>
         </p:txBody>
       </p:sp>
@@ -10692,7 +10698,7 @@
         </p:nvSpPr>
         <p:spPr>
           <a:xfrm>
-            <a:off x="1676400" y="3048000"/>
+            <a:off x="1447800" y="3048000"/>
             <a:ext cx="1066800" cy="369332"/>
           </a:xfrm>
           <a:prstGeom prst="rect">
@@ -10885,6 +10891,7 @@
           <a:bodyPr/>
           <a:lstStyle/>
           <a:p>
+            <a:pPr algn="l"/>
             <a:r>
               <a:rPr lang="en-US" dirty="0" smtClean="0"/>
               <a:t>Demo</a:t>
@@ -10900,12 +10907,12 @@
             <a:spLocks noGrp="1"/>
           </p:cNvSpPr>
           <p:nvPr>
-            <p:ph type="body" idx="1"/>
+            <p:ph idx="1"/>
           </p:nvPr>
         </p:nvSpPr>
         <p:spPr/>
         <p:txBody>
-          <a:bodyPr/>
+          <a:bodyPr anchor="t"/>
           <a:lstStyle/>
           <a:p>
             <a:r>
@@ -10988,7 +10995,7 @@
         </p:nvSpPr>
         <p:spPr/>
         <p:txBody>
-          <a:bodyPr/>
+          <a:bodyPr anchor="t"/>
           <a:lstStyle/>
           <a:p>
             <a:r>
@@ -11005,13 +11012,8 @@
           <a:p>
             <a:r>
               <a:rPr lang="en-US" dirty="0" smtClean="0"/>
-              <a:t>Rank, total, calculate values </a:t>
-            </a:r>
-            <a:r>
-              <a:rPr lang="en-US" smtClean="0"/>
-              <a:t>in windows</a:t>
-            </a:r>
-            <a:endParaRPr lang="en-US" dirty="0" smtClean="0"/>
+              <a:t>Rank, total, calculate values in windows</a:t>
+            </a:r>
           </a:p>
         </p:txBody>
       </p:sp>
@@ -11087,7 +11089,7 @@
         </p:nvSpPr>
         <p:spPr/>
         <p:txBody>
-          <a:bodyPr/>
+          <a:bodyPr anchor="t"/>
           <a:lstStyle/>
           <a:p>
             <a:r>
@@ -11193,7 +11195,7 @@
         </p:nvSpPr>
         <p:spPr/>
         <p:txBody>
-          <a:bodyPr>
+          <a:bodyPr anchor="t">
             <a:normAutofit/>
           </a:bodyPr>
           <a:lstStyle/>
@@ -12020,7 +12022,7 @@
                   <a:schemeClr val="tx1"/>
                 </a:solidFill>
               </a:rPr>
-              <a:t>Get in Touch</a:t>
+              <a:t>Steve Jones</a:t>
             </a:r>
             <a:endParaRPr lang="en-US" sz="3600" dirty="0">
               <a:solidFill>
@@ -12172,41 +12174,6 @@
                 <a:latin typeface="Microsoft Sans Serif" panose="020B0604020202020204" pitchFamily="34" charset="0"/>
               </a:rPr>
               <a:t>@way0utwest</a:t>
-            </a:r>
-          </a:p>
-        </p:txBody>
-      </p:sp>
-      <p:sp>
-        <p:nvSpPr>
-          <p:cNvPr id="21" name="TextBox 20"/>
-          <p:cNvSpPr txBox="1"/>
-          <p:nvPr/>
-        </p:nvSpPr>
-        <p:spPr>
-          <a:xfrm>
-            <a:off x="3700126" y="1143000"/>
-            <a:ext cx="2284600" cy="523220"/>
-          </a:xfrm>
-          <a:prstGeom prst="rect">
-            <a:avLst/>
-          </a:prstGeom>
-          <a:noFill/>
-        </p:spPr>
-        <p:txBody>
-          <a:bodyPr wrap="none" rtlCol="0">
-            <a:spAutoFit/>
-          </a:bodyPr>
-          <a:lstStyle/>
-          <a:p>
-            <a:r>
-              <a:rPr lang="en-US" sz="2800" b="1" dirty="0">
-                <a:solidFill>
-                  <a:srgbClr val="CC0000"/>
-                </a:solidFill>
-                <a:latin typeface="Arial"/>
-                <a:cs typeface="Arial"/>
-              </a:rPr>
-              <a:t>Steve Jones</a:t>
             </a:r>
           </a:p>
         </p:txBody>
@@ -12432,9 +12399,14 @@
   <p:clrMapOvr>
     <a:masterClrMapping/>
   </p:clrMapOvr>
-  <p:transition>
-    <p:fade/>
-  </p:transition>
+  <mc:AlternateContent xmlns:mc="http://schemas.openxmlformats.org/markup-compatibility/2006">
+    <mc:Choice xmlns:p14="http://schemas.microsoft.com/office/powerpoint/2010/main" Requires="p14">
+      <p:transition spd="slow" p14:dur="2000"/>
+    </mc:Choice>
+    <mc:Fallback>
+      <p:transition spd="slow"/>
+    </mc:Fallback>
+  </mc:AlternateContent>
   <p:timing>
     <p:tnLst>
       <p:par>

</xml_diff>